<commit_message>
New commit: Added training package
</commit_message>
<xml_diff>
--- a/slides/Copilot_RooCode_TrainingKit.pptx
+++ b/slides/Copilot_RooCode_TrainingKit.pptx
@@ -5,12 +5,12 @@
     <p:sldMasterId id="2147483648" r:id="rId1"/>
   </p:sldMasterIdLst>
   <p:sldIdLst>
-    <p:sldId id="256" r:id="rId7"/>
-    <p:sldId id="257" r:id="rId8"/>
-    <p:sldId id="258" r:id="rId9"/>
-    <p:sldId id="259" r:id="rId10"/>
-    <p:sldId id="260" r:id="rId11"/>
-    <p:sldId id="261" r:id="rId12"/>
+    <p:sldId id="256" r:id="rId2"/>
+    <p:sldId id="257" r:id="rId3"/>
+    <p:sldId id="258" r:id="rId4"/>
+    <p:sldId id="259" r:id="rId5"/>
+    <p:sldId id="260" r:id="rId6"/>
+    <p:sldId id="261" r:id="rId7"/>
   </p:sldIdLst>
   <p:sldSz cx="9144000" cy="6858000" type="screen4x3"/>
   <p:notesSz cx="6858000" cy="9144000"/>
@@ -109,7 +109,52 @@
       </a:defRPr>
     </a:lvl9pPr>
   </p:defaultTextStyle>
+  <p:extLst>
+    <p:ext uri="{EFAFB233-063F-42B5-8137-9DF3F51BA10A}">
+      <p15:sldGuideLst xmlns:p15="http://schemas.microsoft.com/office/powerpoint/2012/main">
+        <p15:guide id="1" orient="horz" pos="2160">
+          <p15:clr>
+            <a:srgbClr val="A4A3A4"/>
+          </p15:clr>
+        </p15:guide>
+        <p15:guide id="2" pos="2880">
+          <p15:clr>
+            <a:srgbClr val="A4A3A4"/>
+          </p15:clr>
+        </p15:guide>
+      </p15:sldGuideLst>
+    </p:ext>
+  </p:extLst>
 </p:presentation>
+</file>
+
+<file path=ppt/changesInfos/changesInfo1.xml><?xml version="1.0" encoding="utf-8"?>
+<pc:chgInfo xmlns:a="http://schemas.openxmlformats.org/drawingml/2006/main" xmlns:r="http://schemas.openxmlformats.org/officeDocument/2006/relationships" xmlns:ac="http://schemas.microsoft.com/office/drawing/2013/main/command" xmlns:pc="http://schemas.microsoft.com/office/powerpoint/2013/main/command">
+  <pc:docChgLst>
+    <pc:chgData name="Purvansh Jain" userId="d68bad6a-9021-400b-b58e-3526b3b490c0" providerId="ADAL" clId="{5F25C8FB-AD52-4984-AB55-A70AC582DD83}"/>
+    <pc:docChg chg="custSel modSld">
+      <pc:chgData name="Purvansh Jain" userId="d68bad6a-9021-400b-b58e-3526b3b490c0" providerId="ADAL" clId="{5F25C8FB-AD52-4984-AB55-A70AC582DD83}" dt="2025-08-07T19:57:36.369" v="1" actId="27636"/>
+      <pc:docMkLst>
+        <pc:docMk/>
+      </pc:docMkLst>
+      <pc:sldChg chg="modSp mod">
+        <pc:chgData name="Purvansh Jain" userId="d68bad6a-9021-400b-b58e-3526b3b490c0" providerId="ADAL" clId="{5F25C8FB-AD52-4984-AB55-A70AC582DD83}" dt="2025-08-07T19:57:36.369" v="1" actId="27636"/>
+        <pc:sldMkLst>
+          <pc:docMk/>
+          <pc:sldMk cId="0" sldId="258"/>
+        </pc:sldMkLst>
+        <pc:spChg chg="mod">
+          <ac:chgData name="Purvansh Jain" userId="d68bad6a-9021-400b-b58e-3526b3b490c0" providerId="ADAL" clId="{5F25C8FB-AD52-4984-AB55-A70AC582DD83}" dt="2025-08-07T19:57:36.369" v="1" actId="27636"/>
+          <ac:spMkLst>
+            <pc:docMk/>
+            <pc:sldMk cId="0" sldId="258"/>
+            <ac:spMk id="3" creationId="{00000000-0000-0000-0000-000000000000}"/>
+          </ac:spMkLst>
+        </pc:spChg>
+      </pc:sldChg>
+    </pc:docChg>
+  </pc:docChgLst>
+</pc:chgInfo>
 </file>
 
 <file path=ppt/slideLayouts/slideLayout1.xml><?xml version="1.0" encoding="utf-8"?>
@@ -150,10 +195,9 @@
           <a:lstStyle/>
           <a:p>
             <a:r>
-              <a:rPr lang="en-US" smtClean="0"/>
+              <a:rPr lang="en-US"/>
               <a:t>Click to edit Master title style</a:t>
             </a:r>
-            <a:endParaRPr lang="en-US"/>
           </a:p>
         </p:txBody>
       </p:sp>
@@ -269,10 +313,9 @@
           </a:lstStyle>
           <a:p>
             <a:r>
-              <a:rPr lang="en-US" smtClean="0"/>
+              <a:rPr lang="en-US"/>
               <a:t>Click to edit Master subtitle style</a:t>
             </a:r>
-            <a:endParaRPr lang="en-US"/>
           </a:p>
         </p:txBody>
       </p:sp>
@@ -293,7 +336,7 @@
           <a:p>
             <a:fld id="{5BCAD085-E8A6-8845-BD4E-CB4CCA059FC4}" type="datetimeFigureOut">
               <a:rPr lang="en-US" smtClean="0"/>
-              <a:t>1/27/13</a:t>
+              <a:t>8/7/2025</a:t>
             </a:fld>
             <a:endParaRPr lang="en-US"/>
           </a:p>
@@ -387,10 +430,9 @@
           <a:lstStyle/>
           <a:p>
             <a:r>
-              <a:rPr lang="en-US" smtClean="0"/>
+              <a:rPr lang="en-US"/>
               <a:t>Click to edit Master title style</a:t>
             </a:r>
-            <a:endParaRPr lang="en-US"/>
           </a:p>
         </p:txBody>
       </p:sp>
@@ -411,38 +453,37 @@
           <a:p>
             <a:pPr lvl="0"/>
             <a:r>
-              <a:rPr lang="en-US" smtClean="0"/>
+              <a:rPr lang="en-US"/>
               <a:t>Click to edit Master text styles</a:t>
             </a:r>
           </a:p>
           <a:p>
             <a:pPr lvl="1"/>
             <a:r>
-              <a:rPr lang="en-US" smtClean="0"/>
+              <a:rPr lang="en-US"/>
               <a:t>Second level</a:t>
             </a:r>
           </a:p>
           <a:p>
             <a:pPr lvl="2"/>
             <a:r>
-              <a:rPr lang="en-US" smtClean="0"/>
+              <a:rPr lang="en-US"/>
               <a:t>Third level</a:t>
             </a:r>
           </a:p>
           <a:p>
             <a:pPr lvl="3"/>
             <a:r>
-              <a:rPr lang="en-US" smtClean="0"/>
+              <a:rPr lang="en-US"/>
               <a:t>Fourth level</a:t>
             </a:r>
           </a:p>
           <a:p>
             <a:pPr lvl="4"/>
             <a:r>
-              <a:rPr lang="en-US" smtClean="0"/>
+              <a:rPr lang="en-US"/>
               <a:t>Fifth level</a:t>
             </a:r>
-            <a:endParaRPr lang="en-US"/>
           </a:p>
         </p:txBody>
       </p:sp>
@@ -463,7 +504,7 @@
           <a:p>
             <a:fld id="{5BCAD085-E8A6-8845-BD4E-CB4CCA059FC4}" type="datetimeFigureOut">
               <a:rPr lang="en-US" smtClean="0"/>
-              <a:t>1/27/13</a:t>
+              <a:t>8/7/2025</a:t>
             </a:fld>
             <a:endParaRPr lang="en-US"/>
           </a:p>
@@ -562,10 +603,9 @@
           <a:lstStyle/>
           <a:p>
             <a:r>
-              <a:rPr lang="en-US" smtClean="0"/>
+              <a:rPr lang="en-US"/>
               <a:t>Click to edit Master title style</a:t>
             </a:r>
-            <a:endParaRPr lang="en-US"/>
           </a:p>
         </p:txBody>
       </p:sp>
@@ -591,38 +631,37 @@
           <a:p>
             <a:pPr lvl="0"/>
             <a:r>
-              <a:rPr lang="en-US" smtClean="0"/>
+              <a:rPr lang="en-US"/>
               <a:t>Click to edit Master text styles</a:t>
             </a:r>
           </a:p>
           <a:p>
             <a:pPr lvl="1"/>
             <a:r>
-              <a:rPr lang="en-US" smtClean="0"/>
+              <a:rPr lang="en-US"/>
               <a:t>Second level</a:t>
             </a:r>
           </a:p>
           <a:p>
             <a:pPr lvl="2"/>
             <a:r>
-              <a:rPr lang="en-US" smtClean="0"/>
+              <a:rPr lang="en-US"/>
               <a:t>Third level</a:t>
             </a:r>
           </a:p>
           <a:p>
             <a:pPr lvl="3"/>
             <a:r>
-              <a:rPr lang="en-US" smtClean="0"/>
+              <a:rPr lang="en-US"/>
               <a:t>Fourth level</a:t>
             </a:r>
           </a:p>
           <a:p>
             <a:pPr lvl="4"/>
             <a:r>
-              <a:rPr lang="en-US" smtClean="0"/>
+              <a:rPr lang="en-US"/>
               <a:t>Fifth level</a:t>
             </a:r>
-            <a:endParaRPr lang="en-US"/>
           </a:p>
         </p:txBody>
       </p:sp>
@@ -643,7 +682,7 @@
           <a:p>
             <a:fld id="{5BCAD085-E8A6-8845-BD4E-CB4CCA059FC4}" type="datetimeFigureOut">
               <a:rPr lang="en-US" smtClean="0"/>
-              <a:t>1/27/13</a:t>
+              <a:t>8/7/2025</a:t>
             </a:fld>
             <a:endParaRPr lang="en-US"/>
           </a:p>
@@ -737,10 +776,9 @@
           <a:lstStyle/>
           <a:p>
             <a:r>
-              <a:rPr lang="en-US" smtClean="0"/>
+              <a:rPr lang="en-US"/>
               <a:t>Click to edit Master title style</a:t>
             </a:r>
-            <a:endParaRPr lang="en-US"/>
           </a:p>
         </p:txBody>
       </p:sp>
@@ -761,38 +799,37 @@
           <a:p>
             <a:pPr lvl="0"/>
             <a:r>
-              <a:rPr lang="en-US" smtClean="0"/>
+              <a:rPr lang="en-US"/>
               <a:t>Click to edit Master text styles</a:t>
             </a:r>
           </a:p>
           <a:p>
             <a:pPr lvl="1"/>
             <a:r>
-              <a:rPr lang="en-US" smtClean="0"/>
+              <a:rPr lang="en-US"/>
               <a:t>Second level</a:t>
             </a:r>
           </a:p>
           <a:p>
             <a:pPr lvl="2"/>
             <a:r>
-              <a:rPr lang="en-US" smtClean="0"/>
+              <a:rPr lang="en-US"/>
               <a:t>Third level</a:t>
             </a:r>
           </a:p>
           <a:p>
             <a:pPr lvl="3"/>
             <a:r>
-              <a:rPr lang="en-US" smtClean="0"/>
+              <a:rPr lang="en-US"/>
               <a:t>Fourth level</a:t>
             </a:r>
           </a:p>
           <a:p>
             <a:pPr lvl="4"/>
             <a:r>
-              <a:rPr lang="en-US" smtClean="0"/>
+              <a:rPr lang="en-US"/>
               <a:t>Fifth level</a:t>
             </a:r>
-            <a:endParaRPr lang="en-US"/>
           </a:p>
         </p:txBody>
       </p:sp>
@@ -813,7 +850,7 @@
           <a:p>
             <a:fld id="{5BCAD085-E8A6-8845-BD4E-CB4CCA059FC4}" type="datetimeFigureOut">
               <a:rPr lang="en-US" smtClean="0"/>
-              <a:t>1/27/13</a:t>
+              <a:t>8/7/2025</a:t>
             </a:fld>
             <a:endParaRPr lang="en-US"/>
           </a:p>
@@ -916,10 +953,9 @@
           </a:lstStyle>
           <a:p>
             <a:r>
-              <a:rPr lang="en-US" smtClean="0"/>
+              <a:rPr lang="en-US"/>
               <a:t>Click to edit Master title style</a:t>
             </a:r>
-            <a:endParaRPr lang="en-US"/>
           </a:p>
         </p:txBody>
       </p:sp>
@@ -1036,7 +1072,7 @@
           <a:p>
             <a:pPr lvl="0"/>
             <a:r>
-              <a:rPr lang="en-US" smtClean="0"/>
+              <a:rPr lang="en-US"/>
               <a:t>Click to edit Master text styles</a:t>
             </a:r>
           </a:p>
@@ -1059,7 +1095,7 @@
           <a:p>
             <a:fld id="{5BCAD085-E8A6-8845-BD4E-CB4CCA059FC4}" type="datetimeFigureOut">
               <a:rPr lang="en-US" smtClean="0"/>
-              <a:t>1/27/13</a:t>
+              <a:t>8/7/2025</a:t>
             </a:fld>
             <a:endParaRPr lang="en-US"/>
           </a:p>
@@ -1153,10 +1189,9 @@
           <a:lstStyle/>
           <a:p>
             <a:r>
-              <a:rPr lang="en-US" smtClean="0"/>
+              <a:rPr lang="en-US"/>
               <a:t>Click to edit Master title style</a:t>
             </a:r>
-            <a:endParaRPr lang="en-US"/>
           </a:p>
         </p:txBody>
       </p:sp>
@@ -1210,38 +1245,37 @@
           <a:p>
             <a:pPr lvl="0"/>
             <a:r>
-              <a:rPr lang="en-US" smtClean="0"/>
+              <a:rPr lang="en-US"/>
               <a:t>Click to edit Master text styles</a:t>
             </a:r>
           </a:p>
           <a:p>
             <a:pPr lvl="1"/>
             <a:r>
-              <a:rPr lang="en-US" smtClean="0"/>
+              <a:rPr lang="en-US"/>
               <a:t>Second level</a:t>
             </a:r>
           </a:p>
           <a:p>
             <a:pPr lvl="2"/>
             <a:r>
-              <a:rPr lang="en-US" smtClean="0"/>
+              <a:rPr lang="en-US"/>
               <a:t>Third level</a:t>
             </a:r>
           </a:p>
           <a:p>
             <a:pPr lvl="3"/>
             <a:r>
-              <a:rPr lang="en-US" smtClean="0"/>
+              <a:rPr lang="en-US"/>
               <a:t>Fourth level</a:t>
             </a:r>
           </a:p>
           <a:p>
             <a:pPr lvl="4"/>
             <a:r>
-              <a:rPr lang="en-US" smtClean="0"/>
+              <a:rPr lang="en-US"/>
               <a:t>Fifth level</a:t>
             </a:r>
-            <a:endParaRPr lang="en-US"/>
           </a:p>
         </p:txBody>
       </p:sp>
@@ -1295,38 +1329,37 @@
           <a:p>
             <a:pPr lvl="0"/>
             <a:r>
-              <a:rPr lang="en-US" smtClean="0"/>
+              <a:rPr lang="en-US"/>
               <a:t>Click to edit Master text styles</a:t>
             </a:r>
           </a:p>
           <a:p>
             <a:pPr lvl="1"/>
             <a:r>
-              <a:rPr lang="en-US" smtClean="0"/>
+              <a:rPr lang="en-US"/>
               <a:t>Second level</a:t>
             </a:r>
           </a:p>
           <a:p>
             <a:pPr lvl="2"/>
             <a:r>
-              <a:rPr lang="en-US" smtClean="0"/>
+              <a:rPr lang="en-US"/>
               <a:t>Third level</a:t>
             </a:r>
           </a:p>
           <a:p>
             <a:pPr lvl="3"/>
             <a:r>
-              <a:rPr lang="en-US" smtClean="0"/>
+              <a:rPr lang="en-US"/>
               <a:t>Fourth level</a:t>
             </a:r>
           </a:p>
           <a:p>
             <a:pPr lvl="4"/>
             <a:r>
-              <a:rPr lang="en-US" smtClean="0"/>
+              <a:rPr lang="en-US"/>
               <a:t>Fifth level</a:t>
             </a:r>
-            <a:endParaRPr lang="en-US"/>
           </a:p>
         </p:txBody>
       </p:sp>
@@ -1347,7 +1380,7 @@
           <a:p>
             <a:fld id="{5BCAD085-E8A6-8845-BD4E-CB4CCA059FC4}" type="datetimeFigureOut">
               <a:rPr lang="en-US" smtClean="0"/>
-              <a:t>1/27/13</a:t>
+              <a:t>8/7/2025</a:t>
             </a:fld>
             <a:endParaRPr lang="en-US"/>
           </a:p>
@@ -1445,10 +1478,9 @@
           </a:lstStyle>
           <a:p>
             <a:r>
-              <a:rPr lang="en-US" smtClean="0"/>
+              <a:rPr lang="en-US"/>
               <a:t>Click to edit Master title style</a:t>
             </a:r>
-            <a:endParaRPr lang="en-US"/>
           </a:p>
         </p:txBody>
       </p:sp>
@@ -1511,7 +1543,7 @@
           <a:p>
             <a:pPr lvl="0"/>
             <a:r>
-              <a:rPr lang="en-US" smtClean="0"/>
+              <a:rPr lang="en-US"/>
               <a:t>Click to edit Master text styles</a:t>
             </a:r>
           </a:p>
@@ -1567,38 +1599,37 @@
           <a:p>
             <a:pPr lvl="0"/>
             <a:r>
-              <a:rPr lang="en-US" smtClean="0"/>
+              <a:rPr lang="en-US"/>
               <a:t>Click to edit Master text styles</a:t>
             </a:r>
           </a:p>
           <a:p>
             <a:pPr lvl="1"/>
             <a:r>
-              <a:rPr lang="en-US" smtClean="0"/>
+              <a:rPr lang="en-US"/>
               <a:t>Second level</a:t>
             </a:r>
           </a:p>
           <a:p>
             <a:pPr lvl="2"/>
             <a:r>
-              <a:rPr lang="en-US" smtClean="0"/>
+              <a:rPr lang="en-US"/>
               <a:t>Third level</a:t>
             </a:r>
           </a:p>
           <a:p>
             <a:pPr lvl="3"/>
             <a:r>
-              <a:rPr lang="en-US" smtClean="0"/>
+              <a:rPr lang="en-US"/>
               <a:t>Fourth level</a:t>
             </a:r>
           </a:p>
           <a:p>
             <a:pPr lvl="4"/>
             <a:r>
-              <a:rPr lang="en-US" smtClean="0"/>
+              <a:rPr lang="en-US"/>
               <a:t>Fifth level</a:t>
             </a:r>
-            <a:endParaRPr lang="en-US"/>
           </a:p>
         </p:txBody>
       </p:sp>
@@ -1661,7 +1692,7 @@
           <a:p>
             <a:pPr lvl="0"/>
             <a:r>
-              <a:rPr lang="en-US" smtClean="0"/>
+              <a:rPr lang="en-US"/>
               <a:t>Click to edit Master text styles</a:t>
             </a:r>
           </a:p>
@@ -1717,38 +1748,37 @@
           <a:p>
             <a:pPr lvl="0"/>
             <a:r>
-              <a:rPr lang="en-US" smtClean="0"/>
+              <a:rPr lang="en-US"/>
               <a:t>Click to edit Master text styles</a:t>
             </a:r>
           </a:p>
           <a:p>
             <a:pPr lvl="1"/>
             <a:r>
-              <a:rPr lang="en-US" smtClean="0"/>
+              <a:rPr lang="en-US"/>
               <a:t>Second level</a:t>
             </a:r>
           </a:p>
           <a:p>
             <a:pPr lvl="2"/>
             <a:r>
-              <a:rPr lang="en-US" smtClean="0"/>
+              <a:rPr lang="en-US"/>
               <a:t>Third level</a:t>
             </a:r>
           </a:p>
           <a:p>
             <a:pPr lvl="3"/>
             <a:r>
-              <a:rPr lang="en-US" smtClean="0"/>
+              <a:rPr lang="en-US"/>
               <a:t>Fourth level</a:t>
             </a:r>
           </a:p>
           <a:p>
             <a:pPr lvl="4"/>
             <a:r>
-              <a:rPr lang="en-US" smtClean="0"/>
+              <a:rPr lang="en-US"/>
               <a:t>Fifth level</a:t>
             </a:r>
-            <a:endParaRPr lang="en-US"/>
           </a:p>
         </p:txBody>
       </p:sp>
@@ -1769,7 +1799,7 @@
           <a:p>
             <a:fld id="{5BCAD085-E8A6-8845-BD4E-CB4CCA059FC4}" type="datetimeFigureOut">
               <a:rPr lang="en-US" smtClean="0"/>
-              <a:t>1/27/13</a:t>
+              <a:t>8/7/2025</a:t>
             </a:fld>
             <a:endParaRPr lang="en-US"/>
           </a:p>
@@ -1863,10 +1893,9 @@
           <a:lstStyle/>
           <a:p>
             <a:r>
-              <a:rPr lang="en-US" smtClean="0"/>
+              <a:rPr lang="en-US"/>
               <a:t>Click to edit Master title style</a:t>
             </a:r>
-            <a:endParaRPr lang="en-US"/>
           </a:p>
         </p:txBody>
       </p:sp>
@@ -1887,7 +1916,7 @@
           <a:p>
             <a:fld id="{5BCAD085-E8A6-8845-BD4E-CB4CCA059FC4}" type="datetimeFigureOut">
               <a:rPr lang="en-US" smtClean="0"/>
-              <a:t>1/27/13</a:t>
+              <a:t>8/7/2025</a:t>
             </a:fld>
             <a:endParaRPr lang="en-US"/>
           </a:p>
@@ -1982,7 +2011,7 @@
           <a:p>
             <a:fld id="{5BCAD085-E8A6-8845-BD4E-CB4CCA059FC4}" type="datetimeFigureOut">
               <a:rPr lang="en-US" smtClean="0"/>
-              <a:t>1/27/13</a:t>
+              <a:t>8/7/2025</a:t>
             </a:fld>
             <a:endParaRPr lang="en-US"/>
           </a:p>
@@ -2085,10 +2114,9 @@
           </a:lstStyle>
           <a:p>
             <a:r>
-              <a:rPr lang="en-US" smtClean="0"/>
+              <a:rPr lang="en-US"/>
               <a:t>Click to edit Master title style</a:t>
             </a:r>
-            <a:endParaRPr lang="en-US"/>
           </a:p>
         </p:txBody>
       </p:sp>
@@ -2142,38 +2170,37 @@
           <a:p>
             <a:pPr lvl="0"/>
             <a:r>
-              <a:rPr lang="en-US" smtClean="0"/>
+              <a:rPr lang="en-US"/>
               <a:t>Click to edit Master text styles</a:t>
             </a:r>
           </a:p>
           <a:p>
             <a:pPr lvl="1"/>
             <a:r>
-              <a:rPr lang="en-US" smtClean="0"/>
+              <a:rPr lang="en-US"/>
               <a:t>Second level</a:t>
             </a:r>
           </a:p>
           <a:p>
             <a:pPr lvl="2"/>
             <a:r>
-              <a:rPr lang="en-US" smtClean="0"/>
+              <a:rPr lang="en-US"/>
               <a:t>Third level</a:t>
             </a:r>
           </a:p>
           <a:p>
             <a:pPr lvl="3"/>
             <a:r>
-              <a:rPr lang="en-US" smtClean="0"/>
+              <a:rPr lang="en-US"/>
               <a:t>Fourth level</a:t>
             </a:r>
           </a:p>
           <a:p>
             <a:pPr lvl="4"/>
             <a:r>
-              <a:rPr lang="en-US" smtClean="0"/>
+              <a:rPr lang="en-US"/>
               <a:t>Fifth level</a:t>
             </a:r>
-            <a:endParaRPr lang="en-US"/>
           </a:p>
         </p:txBody>
       </p:sp>
@@ -2236,7 +2263,7 @@
           <a:p>
             <a:pPr lvl="0"/>
             <a:r>
-              <a:rPr lang="en-US" smtClean="0"/>
+              <a:rPr lang="en-US"/>
               <a:t>Click to edit Master text styles</a:t>
             </a:r>
           </a:p>
@@ -2259,7 +2286,7 @@
           <a:p>
             <a:fld id="{5BCAD085-E8A6-8845-BD4E-CB4CCA059FC4}" type="datetimeFigureOut">
               <a:rPr lang="en-US" smtClean="0"/>
-              <a:t>1/27/13</a:t>
+              <a:t>8/7/2025</a:t>
             </a:fld>
             <a:endParaRPr lang="en-US"/>
           </a:p>
@@ -2362,10 +2389,9 @@
           </a:lstStyle>
           <a:p>
             <a:r>
-              <a:rPr lang="en-US" smtClean="0"/>
+              <a:rPr lang="en-US"/>
               <a:t>Click to edit Master title style</a:t>
             </a:r>
-            <a:endParaRPr lang="en-US"/>
           </a:p>
         </p:txBody>
       </p:sp>
@@ -2489,7 +2515,7 @@
           <a:p>
             <a:pPr lvl="0"/>
             <a:r>
-              <a:rPr lang="en-US" smtClean="0"/>
+              <a:rPr lang="en-US"/>
               <a:t>Click to edit Master text styles</a:t>
             </a:r>
           </a:p>
@@ -2512,7 +2538,7 @@
           <a:p>
             <a:fld id="{5BCAD085-E8A6-8845-BD4E-CB4CCA059FC4}" type="datetimeFigureOut">
               <a:rPr lang="en-US" smtClean="0"/>
-              <a:t>1/27/13</a:t>
+              <a:t>8/7/2025</a:t>
             </a:fld>
             <a:endParaRPr lang="en-US"/>
           </a:p>
@@ -2621,10 +2647,9 @@
           <a:lstStyle/>
           <a:p>
             <a:r>
-              <a:rPr lang="en-US" smtClean="0"/>
+              <a:rPr lang="en-US"/>
               <a:t>Click to edit Master title style</a:t>
             </a:r>
-            <a:endParaRPr lang="en-US"/>
           </a:p>
         </p:txBody>
       </p:sp>
@@ -2655,38 +2680,37 @@
           <a:p>
             <a:pPr lvl="0"/>
             <a:r>
-              <a:rPr lang="en-US" smtClean="0"/>
+              <a:rPr lang="en-US"/>
               <a:t>Click to edit Master text styles</a:t>
             </a:r>
           </a:p>
           <a:p>
             <a:pPr lvl="1"/>
             <a:r>
-              <a:rPr lang="en-US" smtClean="0"/>
+              <a:rPr lang="en-US"/>
               <a:t>Second level</a:t>
             </a:r>
           </a:p>
           <a:p>
             <a:pPr lvl="2"/>
             <a:r>
-              <a:rPr lang="en-US" smtClean="0"/>
+              <a:rPr lang="en-US"/>
               <a:t>Third level</a:t>
             </a:r>
           </a:p>
           <a:p>
             <a:pPr lvl="3"/>
             <a:r>
-              <a:rPr lang="en-US" smtClean="0"/>
+              <a:rPr lang="en-US"/>
               <a:t>Fourth level</a:t>
             </a:r>
           </a:p>
           <a:p>
             <a:pPr lvl="4"/>
             <a:r>
-              <a:rPr lang="en-US" smtClean="0"/>
+              <a:rPr lang="en-US"/>
               <a:t>Fifth level</a:t>
             </a:r>
-            <a:endParaRPr lang="en-US"/>
           </a:p>
         </p:txBody>
       </p:sp>
@@ -2725,7 +2749,7 @@
           <a:p>
             <a:fld id="{5BCAD085-E8A6-8845-BD4E-CB4CCA059FC4}" type="datetimeFigureOut">
               <a:rPr lang="en-US" smtClean="0"/>
-              <a:t>1/27/13</a:t>
+              <a:t>8/7/2025</a:t>
             </a:fld>
             <a:endParaRPr lang="en-US"/>
           </a:p>
@@ -3084,7 +3108,7 @@
 </file>
 
 <file path=ppt/slides/slide1.xml><?xml version="1.0" encoding="utf-8"?>
-<p:sld xmlns:a="http://schemas.openxmlformats.org/drawingml/2006/main" xmlns:p="http://schemas.openxmlformats.org/presentationml/2006/main" xmlns:r="http://schemas.openxmlformats.org/officeDocument/2006/relationships">
+<p:sld xmlns:a="http://schemas.openxmlformats.org/drawingml/2006/main" xmlns:r="http://schemas.openxmlformats.org/officeDocument/2006/relationships" xmlns:p="http://schemas.openxmlformats.org/presentationml/2006/main">
   <p:cSld>
     <p:spTree>
       <p:nvGrpSpPr>
@@ -3092,7 +3116,14 @@
         <p:cNvGrpSpPr/>
         <p:nvPr/>
       </p:nvGrpSpPr>
-      <p:grpSpPr/>
+      <p:grpSpPr>
+        <a:xfrm>
+          <a:off x="0" y="0"/>
+          <a:ext cx="0" cy="0"/>
+          <a:chOff x="0" y="0"/>
+          <a:chExt cx="0" cy="0"/>
+        </a:xfrm>
+      </p:grpSpPr>
       <p:sp>
         <p:nvSpPr>
           <p:cNvPr id="2" name="Title 1"/>
@@ -3144,7 +3175,7 @@
 </file>
 
 <file path=ppt/slides/slide2.xml><?xml version="1.0" encoding="utf-8"?>
-<p:sld xmlns:a="http://schemas.openxmlformats.org/drawingml/2006/main" xmlns:p="http://schemas.openxmlformats.org/presentationml/2006/main" xmlns:r="http://schemas.openxmlformats.org/officeDocument/2006/relationships">
+<p:sld xmlns:a="http://schemas.openxmlformats.org/drawingml/2006/main" xmlns:r="http://schemas.openxmlformats.org/officeDocument/2006/relationships" xmlns:p="http://schemas.openxmlformats.org/presentationml/2006/main">
   <p:cSld>
     <p:spTree>
       <p:nvGrpSpPr>
@@ -3152,7 +3183,14 @@
         <p:cNvGrpSpPr/>
         <p:nvPr/>
       </p:nvGrpSpPr>
-      <p:grpSpPr/>
+      <p:grpSpPr>
+        <a:xfrm>
+          <a:off x="0" y="0"/>
+          <a:ext cx="0" cy="0"/>
+          <a:chOff x="0" y="0"/>
+          <a:chExt cx="0" cy="0"/>
+        </a:xfrm>
+      </p:grpSpPr>
       <p:sp>
         <p:nvSpPr>
           <p:cNvPr id="2" name="Title 1"/>
@@ -3240,7 +3278,7 @@
 </file>
 
 <file path=ppt/slides/slide3.xml><?xml version="1.0" encoding="utf-8"?>
-<p:sld xmlns:a="http://schemas.openxmlformats.org/drawingml/2006/main" xmlns:p="http://schemas.openxmlformats.org/presentationml/2006/main" xmlns:r="http://schemas.openxmlformats.org/officeDocument/2006/relationships">
+<p:sld xmlns:a="http://schemas.openxmlformats.org/drawingml/2006/main" xmlns:r="http://schemas.openxmlformats.org/officeDocument/2006/relationships" xmlns:p="http://schemas.openxmlformats.org/presentationml/2006/main">
   <p:cSld>
     <p:spTree>
       <p:nvGrpSpPr>
@@ -3248,7 +3286,14 @@
         <p:cNvGrpSpPr/>
         <p:nvPr/>
       </p:nvGrpSpPr>
-      <p:grpSpPr/>
+      <p:grpSpPr>
+        <a:xfrm>
+          <a:off x="0" y="0"/>
+          <a:ext cx="0" cy="0"/>
+          <a:chOff x="0" y="0"/>
+          <a:chExt cx="0" cy="0"/>
+        </a:xfrm>
+      </p:grpSpPr>
       <p:sp>
         <p:nvSpPr>
           <p:cNvPr id="2" name="Title 1"/>
@@ -3280,66 +3325,99 @@
             <p:ph idx="1"/>
           </p:nvPr>
         </p:nvSpPr>
-        <p:spPr/>
-        <p:txBody>
-          <a:bodyPr/>
-          <a:lstStyle/>
-          <a:p>
-            <a:r>
+        <p:spPr>
+          <a:xfrm>
+            <a:off x="323022" y="1600200"/>
+            <a:ext cx="8363778" cy="3324639"/>
+          </a:xfrm>
+        </p:spPr>
+        <p:txBody>
+          <a:bodyPr>
+            <a:normAutofit fontScale="62500" lnSpcReduction="20000"/>
+          </a:bodyPr>
+          <a:lstStyle/>
+          <a:p>
+            <a:r>
+              <a:rPr dirty="0"/>
               <a:t>GitHub Copilot</a:t>
             </a:r>
           </a:p>
           <a:p>
             <a:pPr lvl="1"/>
             <a:r>
-              <a:t>Ensure your GitHub account has a Copilot subscription or enterprise licence</a:t>
-            </a:r>
+              <a:rPr dirty="0"/>
+              <a:t>Ensure your GitHub account has a Copilot subscription or enterprise </a:t>
+            </a:r>
+            <a:r>
+              <a:rPr dirty="0" err="1"/>
+              <a:t>licence</a:t>
+            </a:r>
+            <a:endParaRPr dirty="0"/>
           </a:p>
           <a:p>
             <a:pPr lvl="1"/>
             <a:r>
+              <a:rPr dirty="0"/>
               <a:t>Install the GitHub Copilot extension in VS Code</a:t>
             </a:r>
           </a:p>
           <a:p>
             <a:pPr lvl="1"/>
             <a:r>
+              <a:rPr dirty="0"/>
               <a:t>Sign in to GitHub and enable Copilot</a:t>
             </a:r>
           </a:p>
           <a:p>
             <a:pPr lvl="1"/>
             <a:r>
+              <a:rPr dirty="0"/>
               <a:t>(Optional) Install Copilot Chat for conversational assistance</a:t>
             </a:r>
           </a:p>
           <a:p>
-            <a:br/>
-            <a:r>
+            <a:br>
+              <a:rPr dirty="0"/>
+            </a:br>
+            <a:r>
+              <a:rPr dirty="0" err="1"/>
               <a:t>RooCode</a:t>
             </a:r>
+            <a:endParaRPr dirty="0"/>
           </a:p>
           <a:p>
             <a:pPr lvl="1"/>
             <a:r>
-              <a:t>Install RooCode extension from roocode.com</a:t>
+              <a:rPr dirty="0"/>
+              <a:t>Install </a:t>
+            </a:r>
+            <a:r>
+              <a:rPr dirty="0" err="1"/>
+              <a:t>RooCode</a:t>
+            </a:r>
+            <a:r>
+              <a:rPr dirty="0"/>
+              <a:t> extension from roocode.com</a:t>
             </a:r>
           </a:p>
           <a:p>
             <a:pPr lvl="1"/>
             <a:r>
+              <a:rPr dirty="0"/>
               <a:t>Configure your AI provider (e.g., OpenAI, Azure OpenAI) by setting your API key</a:t>
             </a:r>
           </a:p>
           <a:p>
             <a:pPr lvl="1"/>
             <a:r>
+              <a:rPr dirty="0"/>
               <a:t>Use the command palette to run your first code generation or refactoring task</a:t>
             </a:r>
           </a:p>
           <a:p>
             <a:pPr lvl="1"/>
             <a:r>
+              <a:rPr dirty="0"/>
               <a:t>Explore different modes: Code, Architect, Doc and more</a:t>
             </a:r>
           </a:p>
@@ -3354,7 +3432,7 @@
 </file>
 
 <file path=ppt/slides/slide4.xml><?xml version="1.0" encoding="utf-8"?>
-<p:sld xmlns:a="http://schemas.openxmlformats.org/drawingml/2006/main" xmlns:p="http://schemas.openxmlformats.org/presentationml/2006/main" xmlns:r="http://schemas.openxmlformats.org/officeDocument/2006/relationships">
+<p:sld xmlns:a="http://schemas.openxmlformats.org/drawingml/2006/main" xmlns:r="http://schemas.openxmlformats.org/officeDocument/2006/relationships" xmlns:p="http://schemas.openxmlformats.org/presentationml/2006/main">
   <p:cSld>
     <p:spTree>
       <p:nvGrpSpPr>
@@ -3362,7 +3440,14 @@
         <p:cNvGrpSpPr/>
         <p:nvPr/>
       </p:nvGrpSpPr>
-      <p:grpSpPr/>
+      <p:grpSpPr>
+        <a:xfrm>
+          <a:off x="0" y="0"/>
+          <a:ext cx="0" cy="0"/>
+          <a:chOff x="0" y="0"/>
+          <a:chExt cx="0" cy="0"/>
+        </a:xfrm>
+      </p:grpSpPr>
       <p:sp>
         <p:nvSpPr>
           <p:cNvPr id="2" name="Title 1"/>
@@ -3438,7 +3523,7 @@
 </file>
 
 <file path=ppt/slides/slide5.xml><?xml version="1.0" encoding="utf-8"?>
-<p:sld xmlns:a="http://schemas.openxmlformats.org/drawingml/2006/main" xmlns:p="http://schemas.openxmlformats.org/presentationml/2006/main" xmlns:r="http://schemas.openxmlformats.org/officeDocument/2006/relationships">
+<p:sld xmlns:a="http://schemas.openxmlformats.org/drawingml/2006/main" xmlns:r="http://schemas.openxmlformats.org/officeDocument/2006/relationships" xmlns:p="http://schemas.openxmlformats.org/presentationml/2006/main">
   <p:cSld>
     <p:spTree>
       <p:nvGrpSpPr>
@@ -3446,7 +3531,14 @@
         <p:cNvGrpSpPr/>
         <p:nvPr/>
       </p:nvGrpSpPr>
-      <p:grpSpPr/>
+      <p:grpSpPr>
+        <a:xfrm>
+          <a:off x="0" y="0"/>
+          <a:ext cx="0" cy="0"/>
+          <a:chOff x="0" y="0"/>
+          <a:chExt cx="0" cy="0"/>
+        </a:xfrm>
+      </p:grpSpPr>
       <p:sp>
         <p:nvSpPr>
           <p:cNvPr id="2" name="Title 1"/>
@@ -3522,7 +3614,7 @@
 </file>
 
 <file path=ppt/slides/slide6.xml><?xml version="1.0" encoding="utf-8"?>
-<p:sld xmlns:a="http://schemas.openxmlformats.org/drawingml/2006/main" xmlns:p="http://schemas.openxmlformats.org/presentationml/2006/main" xmlns:r="http://schemas.openxmlformats.org/officeDocument/2006/relationships">
+<p:sld xmlns:a="http://schemas.openxmlformats.org/drawingml/2006/main" xmlns:r="http://schemas.openxmlformats.org/officeDocument/2006/relationships" xmlns:p="http://schemas.openxmlformats.org/presentationml/2006/main">
   <p:cSld>
     <p:spTree>
       <p:nvGrpSpPr>
@@ -3530,7 +3622,14 @@
         <p:cNvGrpSpPr/>
         <p:nvPr/>
       </p:nvGrpSpPr>
-      <p:grpSpPr/>
+      <p:grpSpPr>
+        <a:xfrm>
+          <a:off x="0" y="0"/>
+          <a:ext cx="0" cy="0"/>
+          <a:chOff x="0" y="0"/>
+          <a:chExt cx="0" cy="0"/>
+        </a:xfrm>
+      </p:grpSpPr>
       <p:sp>
         <p:nvSpPr>
           <p:cNvPr id="2" name="Title 1"/>

</xml_diff>